<commit_message>
Actualiza presentación con recomendaciones
</commit_message>
<xml_diff>
--- a/Documentacion/Entregables/Presentación Hallazgos.pptx
+++ b/Documentacion/Entregables/Presentación Hallazgos.pptx
@@ -12,7 +12,8 @@
     <p:sldId id="259" r:id="rId6"/>
     <p:sldId id="261" r:id="rId7"/>
     <p:sldId id="263" r:id="rId8"/>
-    <p:sldId id="262" r:id="rId9"/>
+    <p:sldId id="264" r:id="rId9"/>
+    <p:sldId id="262" r:id="rId10"/>
   </p:sldIdLst>
   <p:sldSz cx="12192000" cy="6858000"/>
   <p:notesSz cx="6858000" cy="9144000"/>
@@ -250,7 +251,7 @@
           <a:p>
             <a:fld id="{618CC0EB-A88F-4987-B77F-3AB905B39A22}" type="datetimeFigureOut">
               <a:rPr lang="en-US" smtClean="0"/>
-              <a:t>2/20/2025</a:t>
+              <a:t>2/21/2025</a:t>
             </a:fld>
             <a:endParaRPr lang="en-US"/>
           </a:p>
@@ -420,7 +421,7 @@
           <a:p>
             <a:fld id="{618CC0EB-A88F-4987-B77F-3AB905B39A22}" type="datetimeFigureOut">
               <a:rPr lang="en-US" smtClean="0"/>
-              <a:t>2/20/2025</a:t>
+              <a:t>2/21/2025</a:t>
             </a:fld>
             <a:endParaRPr lang="en-US"/>
           </a:p>
@@ -600,7 +601,7 @@
           <a:p>
             <a:fld id="{618CC0EB-A88F-4987-B77F-3AB905B39A22}" type="datetimeFigureOut">
               <a:rPr lang="en-US" smtClean="0"/>
-              <a:t>2/20/2025</a:t>
+              <a:t>2/21/2025</a:t>
             </a:fld>
             <a:endParaRPr lang="en-US"/>
           </a:p>
@@ -770,7 +771,7 @@
           <a:p>
             <a:fld id="{618CC0EB-A88F-4987-B77F-3AB905B39A22}" type="datetimeFigureOut">
               <a:rPr lang="en-US" smtClean="0"/>
-              <a:t>2/20/2025</a:t>
+              <a:t>2/21/2025</a:t>
             </a:fld>
             <a:endParaRPr lang="en-US"/>
           </a:p>
@@ -1016,7 +1017,7 @@
           <a:p>
             <a:fld id="{618CC0EB-A88F-4987-B77F-3AB905B39A22}" type="datetimeFigureOut">
               <a:rPr lang="en-US" smtClean="0"/>
-              <a:t>2/20/2025</a:t>
+              <a:t>2/21/2025</a:t>
             </a:fld>
             <a:endParaRPr lang="en-US"/>
           </a:p>
@@ -1248,7 +1249,7 @@
           <a:p>
             <a:fld id="{618CC0EB-A88F-4987-B77F-3AB905B39A22}" type="datetimeFigureOut">
               <a:rPr lang="en-US" smtClean="0"/>
-              <a:t>2/20/2025</a:t>
+              <a:t>2/21/2025</a:t>
             </a:fld>
             <a:endParaRPr lang="en-US"/>
           </a:p>
@@ -1615,7 +1616,7 @@
           <a:p>
             <a:fld id="{618CC0EB-A88F-4987-B77F-3AB905B39A22}" type="datetimeFigureOut">
               <a:rPr lang="en-US" smtClean="0"/>
-              <a:t>2/20/2025</a:t>
+              <a:t>2/21/2025</a:t>
             </a:fld>
             <a:endParaRPr lang="en-US"/>
           </a:p>
@@ -1733,7 +1734,7 @@
           <a:p>
             <a:fld id="{618CC0EB-A88F-4987-B77F-3AB905B39A22}" type="datetimeFigureOut">
               <a:rPr lang="en-US" smtClean="0"/>
-              <a:t>2/20/2025</a:t>
+              <a:t>2/21/2025</a:t>
             </a:fld>
             <a:endParaRPr lang="en-US"/>
           </a:p>
@@ -1828,7 +1829,7 @@
           <a:p>
             <a:fld id="{618CC0EB-A88F-4987-B77F-3AB905B39A22}" type="datetimeFigureOut">
               <a:rPr lang="en-US" smtClean="0"/>
-              <a:t>2/20/2025</a:t>
+              <a:t>2/21/2025</a:t>
             </a:fld>
             <a:endParaRPr lang="en-US"/>
           </a:p>
@@ -2105,7 +2106,7 @@
           <a:p>
             <a:fld id="{618CC0EB-A88F-4987-B77F-3AB905B39A22}" type="datetimeFigureOut">
               <a:rPr lang="en-US" smtClean="0"/>
-              <a:t>2/20/2025</a:t>
+              <a:t>2/21/2025</a:t>
             </a:fld>
             <a:endParaRPr lang="en-US"/>
           </a:p>
@@ -2362,7 +2363,7 @@
           <a:p>
             <a:fld id="{618CC0EB-A88F-4987-B77F-3AB905B39A22}" type="datetimeFigureOut">
               <a:rPr lang="en-US" smtClean="0"/>
-              <a:t>2/20/2025</a:t>
+              <a:t>2/21/2025</a:t>
             </a:fld>
             <a:endParaRPr lang="en-US"/>
           </a:p>
@@ -2575,7 +2576,7 @@
           <a:p>
             <a:fld id="{618CC0EB-A88F-4987-B77F-3AB905B39A22}" type="datetimeFigureOut">
               <a:rPr lang="en-US" smtClean="0"/>
-              <a:t>2/20/2025</a:t>
+              <a:t>2/21/2025</a:t>
             </a:fld>
             <a:endParaRPr lang="en-US"/>
           </a:p>
@@ -4923,7 +4924,7 @@
                   </a:schemeClr>
                 </a:solidFill>
               </a:rPr>
-              <a:t>Conclusiones</a:t>
+              <a:t>Hallazgos</a:t>
             </a:r>
             <a:endParaRPr lang="en-US" dirty="0">
               <a:solidFill>
@@ -5333,6 +5334,202 @@
 </file>
 
 <file path=ppt/slides/slide8.xml><?xml version="1.0" encoding="utf-8"?>
+<p:sld xmlns:a="http://schemas.openxmlformats.org/drawingml/2006/main" xmlns:r="http://schemas.openxmlformats.org/officeDocument/2006/relationships" xmlns:p="http://schemas.openxmlformats.org/presentationml/2006/main">
+  <p:cSld>
+    <p:spTree>
+      <p:nvGrpSpPr>
+        <p:cNvPr id="1" name=""/>
+        <p:cNvGrpSpPr/>
+        <p:nvPr/>
+      </p:nvGrpSpPr>
+      <p:grpSpPr>
+        <a:xfrm>
+          <a:off x="0" y="0"/>
+          <a:ext cx="0" cy="0"/>
+          <a:chOff x="0" y="0"/>
+          <a:chExt cx="0" cy="0"/>
+        </a:xfrm>
+      </p:grpSpPr>
+      <p:sp>
+        <p:nvSpPr>
+          <p:cNvPr id="2" name="Título 1">
+            <a:extLst>
+              <a:ext uri="{FF2B5EF4-FFF2-40B4-BE49-F238E27FC236}">
+                <a16:creationId xmlns:a16="http://schemas.microsoft.com/office/drawing/2014/main" id="{AFA9FD67-9E96-17D1-875A-61A151C5C4D7}"/>
+              </a:ext>
+            </a:extLst>
+          </p:cNvPr>
+          <p:cNvSpPr>
+            <a:spLocks noGrp="1"/>
+          </p:cNvSpPr>
+          <p:nvPr>
+            <p:ph type="title"/>
+          </p:nvPr>
+        </p:nvSpPr>
+        <p:spPr/>
+        <p:txBody>
+          <a:bodyPr/>
+          <a:lstStyle/>
+          <a:p>
+            <a:pPr algn="ctr"/>
+            <a:r>
+              <a:rPr lang="es-CO" dirty="0">
+                <a:solidFill>
+                  <a:schemeClr val="accent5">
+                    <a:lumMod val="50000"/>
+                  </a:schemeClr>
+                </a:solidFill>
+              </a:rPr>
+              <a:t>Recomendaciones</a:t>
+            </a:r>
+            <a:endParaRPr lang="en-US" dirty="0">
+              <a:solidFill>
+                <a:schemeClr val="accent5">
+                  <a:lumMod val="50000"/>
+                </a:schemeClr>
+              </a:solidFill>
+            </a:endParaRPr>
+          </a:p>
+        </p:txBody>
+      </p:sp>
+      <p:sp>
+        <p:nvSpPr>
+          <p:cNvPr id="3" name="Marcador de contenido 2">
+            <a:extLst>
+              <a:ext uri="{FF2B5EF4-FFF2-40B4-BE49-F238E27FC236}">
+                <a16:creationId xmlns:a16="http://schemas.microsoft.com/office/drawing/2014/main" id="{AAB1EF86-46C4-EEC8-AE2F-FE14807B1069}"/>
+              </a:ext>
+            </a:extLst>
+          </p:cNvPr>
+          <p:cNvSpPr>
+            <a:spLocks noGrp="1"/>
+          </p:cNvSpPr>
+          <p:nvPr>
+            <p:ph idx="1"/>
+          </p:nvPr>
+        </p:nvSpPr>
+        <p:spPr/>
+        <p:txBody>
+          <a:bodyPr/>
+          <a:lstStyle/>
+          <a:p>
+            <a:endParaRPr lang="es-CO" dirty="0"/>
+          </a:p>
+          <a:p>
+            <a:r>
+              <a:rPr lang="es-CO" dirty="0"/>
+              <a:t>Promocionar las suscripciones anuales en </a:t>
+            </a:r>
+            <a:r>
+              <a:rPr lang="es-CO" dirty="0">
+                <a:solidFill>
+                  <a:schemeClr val="accent6">
+                    <a:lumMod val="75000"/>
+                  </a:schemeClr>
+                </a:solidFill>
+              </a:rPr>
+              <a:t>mayo</a:t>
+            </a:r>
+            <a:r>
+              <a:rPr lang="es-CO" dirty="0"/>
+              <a:t> con alguna oferta de descuento, aprovechando el aumento en viajes de </a:t>
+            </a:r>
+            <a:r>
+              <a:rPr lang="es-CO" dirty="0">
+                <a:solidFill>
+                  <a:schemeClr val="accent2">
+                    <a:lumMod val="75000"/>
+                  </a:schemeClr>
+                </a:solidFill>
+              </a:rPr>
+              <a:t>usuarios casuales </a:t>
+            </a:r>
+            <a:r>
+              <a:rPr lang="es-CO" dirty="0"/>
+              <a:t>en </a:t>
+            </a:r>
+            <a:r>
+              <a:rPr lang="es-CO" dirty="0">
+                <a:solidFill>
+                  <a:schemeClr val="accent6">
+                    <a:lumMod val="75000"/>
+                  </a:schemeClr>
+                </a:solidFill>
+              </a:rPr>
+              <a:t>verano</a:t>
+            </a:r>
+            <a:r>
+              <a:rPr lang="es-CO" dirty="0"/>
+              <a:t>.</a:t>
+            </a:r>
+          </a:p>
+          <a:p>
+            <a:r>
+              <a:rPr lang="es-CO" dirty="0"/>
+              <a:t>Aumentar ligeramente el precio de los alquileres los días </a:t>
+            </a:r>
+            <a:r>
+              <a:rPr lang="es-CO" dirty="0">
+                <a:solidFill>
+                  <a:schemeClr val="accent6">
+                    <a:lumMod val="75000"/>
+                  </a:schemeClr>
+                </a:solidFill>
+              </a:rPr>
+              <a:t>sábado</a:t>
+            </a:r>
+            <a:r>
+              <a:rPr lang="es-CO" dirty="0"/>
+              <a:t> y </a:t>
+            </a:r>
+            <a:r>
+              <a:rPr lang="es-CO" dirty="0">
+                <a:solidFill>
+                  <a:schemeClr val="accent6">
+                    <a:lumMod val="75000"/>
+                  </a:schemeClr>
+                </a:solidFill>
+              </a:rPr>
+              <a:t>domingo</a:t>
+            </a:r>
+            <a:r>
+              <a:rPr lang="es-CO" dirty="0"/>
+              <a:t>, apuntar a un precio que motive a los </a:t>
+            </a:r>
+            <a:r>
+              <a:rPr lang="es-CO" dirty="0">
+                <a:solidFill>
+                  <a:schemeClr val="accent2">
+                    <a:lumMod val="75000"/>
+                  </a:schemeClr>
+                </a:solidFill>
+              </a:rPr>
+              <a:t>usuarios casuales</a:t>
+            </a:r>
+            <a:r>
+              <a:rPr lang="es-CO" dirty="0"/>
+              <a:t> a adquirir la membresía y que no desmotive el uso completo del servicio.</a:t>
+            </a:r>
+          </a:p>
+          <a:p>
+            <a:endParaRPr lang="en-US" dirty="0"/>
+          </a:p>
+        </p:txBody>
+      </p:sp>
+    </p:spTree>
+    <p:extLst>
+      <p:ext uri="{BB962C8B-B14F-4D97-AF65-F5344CB8AC3E}">
+        <p14:creationId xmlns:p14="http://schemas.microsoft.com/office/powerpoint/2010/main" val="1211918106"/>
+      </p:ext>
+    </p:extLst>
+  </p:cSld>
+  <p:clrMapOvr>
+    <a:masterClrMapping/>
+  </p:clrMapOvr>
+</p:sld>
+</file>
+
+<file path=ppt/slides/slide9.xml><?xml version="1.0" encoding="utf-8"?>
 <p:sld xmlns:a="http://schemas.openxmlformats.org/drawingml/2006/main" xmlns:r="http://schemas.openxmlformats.org/officeDocument/2006/relationships" xmlns:p="http://schemas.openxmlformats.org/presentationml/2006/main">
   <p:cSld>
     <p:spTree>

</xml_diff>